<commit_message>
Add Django web framework
</commit_message>
<xml_diff>
--- a/clean_pdfs.pptx
+++ b/clean_pdfs.pptx
@@ -8,6 +8,7 @@
     <p:sldId id="256" r:id="rId2"/>
     <p:sldId id="257" r:id="rId3"/>
     <p:sldId id="258" r:id="rId4"/>
+    <p:sldId id="259" r:id="rId5"/>
   </p:sldIdLst>
   <p:sldSz cx="18288000" cy="6858000"/>
   <p:notesSz cx="6858000" cy="9144000"/>
@@ -245,7 +246,7 @@
           <a:p>
             <a:fld id="{BEDAF5F7-6A62-4081-A741-D67214880DD1}" type="datetimeFigureOut">
               <a:rPr lang="en-US" smtClean="0"/>
-              <a:t>8/21/23</a:t>
+              <a:t>9/8/23</a:t>
             </a:fld>
             <a:endParaRPr lang="en-US"/>
           </a:p>
@@ -415,7 +416,7 @@
           <a:p>
             <a:fld id="{BEDAF5F7-6A62-4081-A741-D67214880DD1}" type="datetimeFigureOut">
               <a:rPr lang="en-US" smtClean="0"/>
-              <a:t>8/21/23</a:t>
+              <a:t>9/8/23</a:t>
             </a:fld>
             <a:endParaRPr lang="en-US"/>
           </a:p>
@@ -595,7 +596,7 @@
           <a:p>
             <a:fld id="{BEDAF5F7-6A62-4081-A741-D67214880DD1}" type="datetimeFigureOut">
               <a:rPr lang="en-US" smtClean="0"/>
-              <a:t>8/21/23</a:t>
+              <a:t>9/8/23</a:t>
             </a:fld>
             <a:endParaRPr lang="en-US"/>
           </a:p>
@@ -765,7 +766,7 @@
           <a:p>
             <a:fld id="{BEDAF5F7-6A62-4081-A741-D67214880DD1}" type="datetimeFigureOut">
               <a:rPr lang="en-US" smtClean="0"/>
-              <a:t>8/21/23</a:t>
+              <a:t>9/8/23</a:t>
             </a:fld>
             <a:endParaRPr lang="en-US"/>
           </a:p>
@@ -1011,7 +1012,7 @@
           <a:p>
             <a:fld id="{BEDAF5F7-6A62-4081-A741-D67214880DD1}" type="datetimeFigureOut">
               <a:rPr lang="en-US" smtClean="0"/>
-              <a:t>8/21/23</a:t>
+              <a:t>9/8/23</a:t>
             </a:fld>
             <a:endParaRPr lang="en-US"/>
           </a:p>
@@ -1243,7 +1244,7 @@
           <a:p>
             <a:fld id="{BEDAF5F7-6A62-4081-A741-D67214880DD1}" type="datetimeFigureOut">
               <a:rPr lang="en-US" smtClean="0"/>
-              <a:t>8/21/23</a:t>
+              <a:t>9/8/23</a:t>
             </a:fld>
             <a:endParaRPr lang="en-US"/>
           </a:p>
@@ -1610,7 +1611,7 @@
           <a:p>
             <a:fld id="{BEDAF5F7-6A62-4081-A741-D67214880DD1}" type="datetimeFigureOut">
               <a:rPr lang="en-US" smtClean="0"/>
-              <a:t>8/21/23</a:t>
+              <a:t>9/8/23</a:t>
             </a:fld>
             <a:endParaRPr lang="en-US"/>
           </a:p>
@@ -1728,7 +1729,7 @@
           <a:p>
             <a:fld id="{BEDAF5F7-6A62-4081-A741-D67214880DD1}" type="datetimeFigureOut">
               <a:rPr lang="en-US" smtClean="0"/>
-              <a:t>8/21/23</a:t>
+              <a:t>9/8/23</a:t>
             </a:fld>
             <a:endParaRPr lang="en-US"/>
           </a:p>
@@ -1823,7 +1824,7 @@
           <a:p>
             <a:fld id="{BEDAF5F7-6A62-4081-A741-D67214880DD1}" type="datetimeFigureOut">
               <a:rPr lang="en-US" smtClean="0"/>
-              <a:t>8/21/23</a:t>
+              <a:t>9/8/23</a:t>
             </a:fld>
             <a:endParaRPr lang="en-US"/>
           </a:p>
@@ -2100,7 +2101,7 @@
           <a:p>
             <a:fld id="{BEDAF5F7-6A62-4081-A741-D67214880DD1}" type="datetimeFigureOut">
               <a:rPr lang="en-US" smtClean="0"/>
-              <a:t>8/21/23</a:t>
+              <a:t>9/8/23</a:t>
             </a:fld>
             <a:endParaRPr lang="en-US"/>
           </a:p>
@@ -2357,7 +2358,7 @@
           <a:p>
             <a:fld id="{BEDAF5F7-6A62-4081-A741-D67214880DD1}" type="datetimeFigureOut">
               <a:rPr lang="en-US" smtClean="0"/>
-              <a:t>8/21/23</a:t>
+              <a:t>9/8/23</a:t>
             </a:fld>
             <a:endParaRPr lang="en-US"/>
           </a:p>
@@ -2570,7 +2571,7 @@
           <a:p>
             <a:fld id="{BEDAF5F7-6A62-4081-A741-D67214880DD1}" type="datetimeFigureOut">
               <a:rPr lang="en-US" smtClean="0"/>
-              <a:t>8/21/23</a:t>
+              <a:t>9/8/23</a:t>
             </a:fld>
             <a:endParaRPr lang="en-US"/>
           </a:p>
@@ -2993,35 +2994,15 @@
         </p:nvSpPr>
         <p:spPr/>
         <p:txBody>
-          <a:bodyPr/>
-          <a:lstStyle/>
-          <a:p>
-            <a:endParaRPr lang="en-US"/>
-          </a:p>
-        </p:txBody>
-      </p:sp>
-      <p:sp>
-        <p:nvSpPr>
-          <p:cNvPr id="3" name="Subtitle 2">
-            <a:extLst>
-              <a:ext uri="{FF2B5EF4-FFF2-40B4-BE49-F238E27FC236}">
-                <a16:creationId xmlns:a16="http://schemas.microsoft.com/office/drawing/2014/main" id="{E5E21904-1098-EE32-B19D-31CC892C1A10}"/>
-              </a:ext>
-            </a:extLst>
-          </p:cNvPr>
-          <p:cNvSpPr>
-            <a:spLocks noGrp="1"/>
-          </p:cNvSpPr>
-          <p:nvPr>
-            <p:ph type="subTitle" idx="1"/>
-          </p:nvPr>
-        </p:nvSpPr>
-        <p:spPr/>
-        <p:txBody>
-          <a:bodyPr/>
-          <a:lstStyle/>
-          <a:p>
-            <a:endParaRPr lang="en-US"/>
+          <a:bodyPr>
+            <a:normAutofit/>
+          </a:bodyPr>
+          <a:lstStyle/>
+          <a:p>
+            <a:r>
+              <a:rPr lang="en-US" b="1" dirty="0"/>
+              <a:t>How to answer questions with information contained in a corpus of PDF documents?</a:t>
+            </a:r>
           </a:p>
         </p:txBody>
       </p:sp>
@@ -7525,6 +7506,354 @@
     <p:extLst>
       <p:ext uri="{BB962C8B-B14F-4D97-AF65-F5344CB8AC3E}">
         <p14:creationId xmlns:p14="http://schemas.microsoft.com/office/powerpoint/2010/main" val="3959580278"/>
+      </p:ext>
+    </p:extLst>
+  </p:cSld>
+  <p:clrMapOvr>
+    <a:masterClrMapping/>
+  </p:clrMapOvr>
+</p:sld>
+</file>
+
+<file path=ppt/slides/slide4.xml><?xml version="1.0" encoding="utf-8"?>
+<p:sld xmlns:a="http://schemas.openxmlformats.org/drawingml/2006/main" xmlns:r="http://schemas.openxmlformats.org/officeDocument/2006/relationships" xmlns:p="http://schemas.openxmlformats.org/presentationml/2006/main">
+  <p:cSld>
+    <p:spTree>
+      <p:nvGrpSpPr>
+        <p:cNvPr id="1" name=""/>
+        <p:cNvGrpSpPr/>
+        <p:nvPr/>
+      </p:nvGrpSpPr>
+      <p:grpSpPr>
+        <a:xfrm>
+          <a:off x="0" y="0"/>
+          <a:ext cx="0" cy="0"/>
+          <a:chOff x="0" y="0"/>
+          <a:chExt cx="0" cy="0"/>
+        </a:xfrm>
+      </p:grpSpPr>
+      <p:sp>
+        <p:nvSpPr>
+          <p:cNvPr id="2" name="Rectangle 1">
+            <a:extLst>
+              <a:ext uri="{FF2B5EF4-FFF2-40B4-BE49-F238E27FC236}">
+                <a16:creationId xmlns:a16="http://schemas.microsoft.com/office/drawing/2014/main" id="{DBE2B981-38CB-1143-BB43-3A1DB16EB089}"/>
+              </a:ext>
+            </a:extLst>
+          </p:cNvPr>
+          <p:cNvSpPr/>
+          <p:nvPr/>
+        </p:nvSpPr>
+        <p:spPr>
+          <a:xfrm>
+            <a:off x="1214438" y="942975"/>
+            <a:ext cx="4872037" cy="371475"/>
+          </a:xfrm>
+          <a:prstGeom prst="rect">
+            <a:avLst/>
+          </a:prstGeom>
+        </p:spPr>
+        <p:style>
+          <a:lnRef idx="0">
+            <a:schemeClr val="accent3"/>
+          </a:lnRef>
+          <a:fillRef idx="3">
+            <a:schemeClr val="accent3"/>
+          </a:fillRef>
+          <a:effectRef idx="3">
+            <a:schemeClr val="accent3"/>
+          </a:effectRef>
+          <a:fontRef idx="minor">
+            <a:schemeClr val="lt1"/>
+          </a:fontRef>
+        </p:style>
+        <p:txBody>
+          <a:bodyPr rtlCol="0" anchor="ctr"/>
+          <a:lstStyle/>
+          <a:p>
+            <a:pPr algn="ctr"/>
+            <a:r>
+              <a:rPr lang="en-US" dirty="0"/>
+              <a:t>Query</a:t>
+            </a:r>
+          </a:p>
+        </p:txBody>
+      </p:sp>
+      <p:sp>
+        <p:nvSpPr>
+          <p:cNvPr id="3" name="Rectangle 2">
+            <a:extLst>
+              <a:ext uri="{FF2B5EF4-FFF2-40B4-BE49-F238E27FC236}">
+                <a16:creationId xmlns:a16="http://schemas.microsoft.com/office/drawing/2014/main" id="{7D52F9F8-FBA8-F843-80A8-D9C8212F7654}"/>
+              </a:ext>
+            </a:extLst>
+          </p:cNvPr>
+          <p:cNvSpPr/>
+          <p:nvPr/>
+        </p:nvSpPr>
+        <p:spPr>
+          <a:xfrm>
+            <a:off x="1214437" y="1595437"/>
+            <a:ext cx="4872037" cy="1719263"/>
+          </a:xfrm>
+          <a:prstGeom prst="rect">
+            <a:avLst/>
+          </a:prstGeom>
+        </p:spPr>
+        <p:style>
+          <a:lnRef idx="0">
+            <a:schemeClr val="accent3"/>
+          </a:lnRef>
+          <a:fillRef idx="3">
+            <a:schemeClr val="accent3"/>
+          </a:fillRef>
+          <a:effectRef idx="3">
+            <a:schemeClr val="accent3"/>
+          </a:effectRef>
+          <a:fontRef idx="minor">
+            <a:schemeClr val="lt1"/>
+          </a:fontRef>
+        </p:style>
+        <p:txBody>
+          <a:bodyPr rtlCol="0" anchor="ctr"/>
+          <a:lstStyle/>
+          <a:p>
+            <a:pPr algn="ctr"/>
+            <a:r>
+              <a:rPr lang="en-US" dirty="0"/>
+              <a:t>Query</a:t>
+            </a:r>
+          </a:p>
+        </p:txBody>
+      </p:sp>
+      <p:sp>
+        <p:nvSpPr>
+          <p:cNvPr id="4" name="Rectangle 3">
+            <a:extLst>
+              <a:ext uri="{FF2B5EF4-FFF2-40B4-BE49-F238E27FC236}">
+                <a16:creationId xmlns:a16="http://schemas.microsoft.com/office/drawing/2014/main" id="{33FA30A8-6FAE-4E44-9EC2-7602D0C34867}"/>
+              </a:ext>
+            </a:extLst>
+          </p:cNvPr>
+          <p:cNvSpPr/>
+          <p:nvPr/>
+        </p:nvSpPr>
+        <p:spPr>
+          <a:xfrm>
+            <a:off x="1214437" y="3624263"/>
+            <a:ext cx="4872037" cy="1719263"/>
+          </a:xfrm>
+          <a:prstGeom prst="rect">
+            <a:avLst/>
+          </a:prstGeom>
+        </p:spPr>
+        <p:style>
+          <a:lnRef idx="0">
+            <a:schemeClr val="accent3"/>
+          </a:lnRef>
+          <a:fillRef idx="3">
+            <a:schemeClr val="accent3"/>
+          </a:fillRef>
+          <a:effectRef idx="3">
+            <a:schemeClr val="accent3"/>
+          </a:effectRef>
+          <a:fontRef idx="minor">
+            <a:schemeClr val="lt1"/>
+          </a:fontRef>
+        </p:style>
+        <p:txBody>
+          <a:bodyPr rtlCol="0" anchor="ctr"/>
+          <a:lstStyle/>
+          <a:p>
+            <a:pPr algn="ctr"/>
+            <a:r>
+              <a:rPr lang="en-US" dirty="0"/>
+              <a:t>Query</a:t>
+            </a:r>
+          </a:p>
+        </p:txBody>
+      </p:sp>
+      <p:graphicFrame>
+        <p:nvGraphicFramePr>
+          <p:cNvPr id="5" name="Table 5">
+            <a:extLst>
+              <a:ext uri="{FF2B5EF4-FFF2-40B4-BE49-F238E27FC236}">
+                <a16:creationId xmlns:a16="http://schemas.microsoft.com/office/drawing/2014/main" id="{56C259EF-EDE7-1949-8FAA-DDBCEBDC783E}"/>
+              </a:ext>
+            </a:extLst>
+          </p:cNvPr>
+          <p:cNvGraphicFramePr>
+            <a:graphicFrameLocks noGrp="1"/>
+          </p:cNvGraphicFramePr>
+          <p:nvPr>
+            <p:extLst>
+              <p:ext uri="{D42A27DB-BD31-4B8C-83A1-F6EECF244321}">
+                <p14:modId xmlns:p14="http://schemas.microsoft.com/office/powerpoint/2010/main" val="3649849447"/>
+              </p:ext>
+            </p:extLst>
+          </p:nvPr>
+        </p:nvGraphicFramePr>
+        <p:xfrm>
+          <a:off x="6334125" y="1595437"/>
+          <a:ext cx="8336280" cy="1107440"/>
+        </p:xfrm>
+        <a:graphic>
+          <a:graphicData uri="http://schemas.openxmlformats.org/drawingml/2006/table">
+            <a:tbl>
+              <a:tblPr firstRow="1" bandRow="1">
+                <a:tableStyleId>{5C22544A-7EE6-4342-B048-85BDC9FD1C3A}</a:tableStyleId>
+              </a:tblPr>
+              <a:tblGrid>
+                <a:gridCol w="2466975">
+                  <a:extLst>
+                    <a:ext uri="{9D8B030D-6E8A-4147-A177-3AD203B41FA5}">
+                      <a16:colId xmlns:a16="http://schemas.microsoft.com/office/drawing/2014/main" val="3583589481"/>
+                    </a:ext>
+                  </a:extLst>
+                </a:gridCol>
+                <a:gridCol w="2628900">
+                  <a:extLst>
+                    <a:ext uri="{9D8B030D-6E8A-4147-A177-3AD203B41FA5}">
+                      <a16:colId xmlns:a16="http://schemas.microsoft.com/office/drawing/2014/main" val="2094344867"/>
+                    </a:ext>
+                  </a:extLst>
+                </a:gridCol>
+                <a:gridCol w="3240405">
+                  <a:extLst>
+                    <a:ext uri="{9D8B030D-6E8A-4147-A177-3AD203B41FA5}">
+                      <a16:colId xmlns:a16="http://schemas.microsoft.com/office/drawing/2014/main" val="271369979"/>
+                    </a:ext>
+                  </a:extLst>
+                </a:gridCol>
+              </a:tblGrid>
+              <a:tr h="280988">
+                <a:tc>
+                  <a:txBody>
+                    <a:bodyPr/>
+                    <a:lstStyle/>
+                    <a:p>
+                      <a:r>
+                        <a:rPr lang="en-US" dirty="0"/>
+                        <a:t>Document</a:t>
+                      </a:r>
+                    </a:p>
+                  </a:txBody>
+                  <a:tcPr/>
+                </a:tc>
+                <a:tc>
+                  <a:txBody>
+                    <a:bodyPr/>
+                    <a:lstStyle/>
+                    <a:p>
+                      <a:r>
+                        <a:rPr lang="en-US" dirty="0"/>
+                        <a:t>Response</a:t>
+                      </a:r>
+                    </a:p>
+                  </a:txBody>
+                  <a:tcPr/>
+                </a:tc>
+                <a:tc>
+                  <a:txBody>
+                    <a:bodyPr/>
+                    <a:lstStyle/>
+                    <a:p>
+                      <a:r>
+                        <a:rPr lang="en-US" dirty="0"/>
+                        <a:t>Confidence</a:t>
+                      </a:r>
+                    </a:p>
+                  </a:txBody>
+                  <a:tcPr/>
+                </a:tc>
+                <a:extLst>
+                  <a:ext uri="{0D108BD9-81ED-4DB2-BD59-A6C34878D82A}">
+                    <a16:rowId xmlns:a16="http://schemas.microsoft.com/office/drawing/2014/main" val="1101478970"/>
+                  </a:ext>
+                </a:extLst>
+              </a:tr>
+              <a:tr h="370840">
+                <a:tc>
+                  <a:txBody>
+                    <a:bodyPr/>
+                    <a:lstStyle/>
+                    <a:p>
+                      <a:endParaRPr lang="en-US" dirty="0"/>
+                    </a:p>
+                  </a:txBody>
+                  <a:tcPr/>
+                </a:tc>
+                <a:tc>
+                  <a:txBody>
+                    <a:bodyPr/>
+                    <a:lstStyle/>
+                    <a:p>
+                      <a:endParaRPr lang="en-US" dirty="0"/>
+                    </a:p>
+                  </a:txBody>
+                  <a:tcPr/>
+                </a:tc>
+                <a:tc>
+                  <a:txBody>
+                    <a:bodyPr/>
+                    <a:lstStyle/>
+                    <a:p>
+                      <a:endParaRPr lang="en-US"/>
+                    </a:p>
+                  </a:txBody>
+                  <a:tcPr/>
+                </a:tc>
+                <a:extLst>
+                  <a:ext uri="{0D108BD9-81ED-4DB2-BD59-A6C34878D82A}">
+                    <a16:rowId xmlns:a16="http://schemas.microsoft.com/office/drawing/2014/main" val="2865096730"/>
+                  </a:ext>
+                </a:extLst>
+              </a:tr>
+              <a:tr h="370840">
+                <a:tc>
+                  <a:txBody>
+                    <a:bodyPr/>
+                    <a:lstStyle/>
+                    <a:p>
+                      <a:endParaRPr lang="en-US"/>
+                    </a:p>
+                  </a:txBody>
+                  <a:tcPr/>
+                </a:tc>
+                <a:tc>
+                  <a:txBody>
+                    <a:bodyPr/>
+                    <a:lstStyle/>
+                    <a:p>
+                      <a:endParaRPr lang="en-US"/>
+                    </a:p>
+                  </a:txBody>
+                  <a:tcPr/>
+                </a:tc>
+                <a:tc>
+                  <a:txBody>
+                    <a:bodyPr/>
+                    <a:lstStyle/>
+                    <a:p>
+                      <a:endParaRPr lang="en-US" dirty="0"/>
+                    </a:p>
+                  </a:txBody>
+                  <a:tcPr/>
+                </a:tc>
+                <a:extLst>
+                  <a:ext uri="{0D108BD9-81ED-4DB2-BD59-A6C34878D82A}">
+                    <a16:rowId xmlns:a16="http://schemas.microsoft.com/office/drawing/2014/main" val="3703836111"/>
+                  </a:ext>
+                </a:extLst>
+              </a:tr>
+            </a:tbl>
+          </a:graphicData>
+        </a:graphic>
+      </p:graphicFrame>
+    </p:spTree>
+    <p:extLst>
+      <p:ext uri="{BB962C8B-B14F-4D97-AF65-F5344CB8AC3E}">
+        <p14:creationId xmlns:p14="http://schemas.microsoft.com/office/powerpoint/2010/main" val="502203634"/>
       </p:ext>
     </p:extLst>
   </p:cSld>

</xml_diff>